<commit_message>
Updated lightning talk with animations
</commit_message>
<xml_diff>
--- a/Lightning Talk.pptx
+++ b/Lightning Talk.pptx
@@ -202,7 +202,7 @@
           <a:p>
             <a:fld id="{E2899D46-1E0B-4420-8741-92F6D0166A1B}" type="datetimeFigureOut">
               <a:rPr lang="en-US" smtClean="0"/>
-              <a:t>4/22/2020</a:t>
+              <a:t>4/23/2020</a:t>
             </a:fld>
             <a:endParaRPr lang="en-US"/>
           </a:p>
@@ -619,6 +619,12 @@
           <a:lstStyle/>
           <a:p>
             <a:r>
+              <a:rPr lang="en-US"/>
+              <a:t>Two test sets.</a:t>
+            </a:r>
+          </a:p>
+          <a:p>
+            <a:r>
               <a:rPr lang="en-US" dirty="0"/>
               <a:t>Android apps use the Gradle build system.</a:t>
             </a:r>
@@ -1201,7 +1207,7 @@
             <a:fld id="{5FC4E2AD-B813-4B69-931D-F8E70443C263}" type="datetime1">
               <a:rPr lang="en-US" smtClean="0"/>
               <a:pPr/>
-              <a:t>4/22/2020</a:t>
+              <a:t>4/23/2020</a:t>
             </a:fld>
             <a:endParaRPr lang="en-US"/>
           </a:p>
@@ -1425,7 +1431,7 @@
             <a:fld id="{58525C5E-9F15-47F9-9EEB-02850613EB3E}" type="datetime1">
               <a:rPr lang="en-US" smtClean="0"/>
               <a:pPr/>
-              <a:t>4/22/2020</a:t>
+              <a:t>4/23/2020</a:t>
             </a:fld>
             <a:endParaRPr lang="en-US"/>
           </a:p>
@@ -1659,7 +1665,7 @@
             <a:fld id="{D0144A0C-1A44-49B2-A404-6EAAA15ABD5A}" type="datetime1">
               <a:rPr lang="en-US" smtClean="0"/>
               <a:pPr/>
-              <a:t>4/22/2020</a:t>
+              <a:t>4/23/2020</a:t>
             </a:fld>
             <a:endParaRPr lang="en-US"/>
           </a:p>
@@ -1883,7 +1889,7 @@
             <a:fld id="{FFD5860E-5C51-43A5-BF43-2D439BEE27F6}" type="datetime1">
               <a:rPr lang="en-US" smtClean="0"/>
               <a:pPr/>
-              <a:t>4/22/2020</a:t>
+              <a:t>4/23/2020</a:t>
             </a:fld>
             <a:endParaRPr lang="en-US"/>
           </a:p>
@@ -2184,7 +2190,7 @@
             <a:fld id="{2F08FDF9-4066-4900-89B1-04E6CA7299BE}" type="datetime1">
               <a:rPr lang="en-US" smtClean="0"/>
               <a:pPr/>
-              <a:t>4/22/2020</a:t>
+              <a:t>4/23/2020</a:t>
             </a:fld>
             <a:endParaRPr lang="en-US"/>
           </a:p>
@@ -2475,7 +2481,7 @@
             <a:fld id="{8644D212-7F25-45E5-AF86-805A0A6E857C}" type="datetime1">
               <a:rPr lang="en-US" smtClean="0"/>
               <a:pPr/>
-              <a:t>4/22/2020</a:t>
+              <a:t>4/23/2020</a:t>
             </a:fld>
             <a:endParaRPr lang="en-US"/>
           </a:p>
@@ -2913,7 +2919,7 @@
             <a:fld id="{EFA21AF9-9EC0-474A-9D5D-EBAE4BCB5E24}" type="datetime1">
               <a:rPr lang="en-US" smtClean="0"/>
               <a:pPr/>
-              <a:t>4/22/2020</a:t>
+              <a:t>4/23/2020</a:t>
             </a:fld>
             <a:endParaRPr lang="en-US"/>
           </a:p>
@@ -3080,7 +3086,7 @@
             <a:fld id="{F45C548E-79A5-4934-9529-685B2B64FB84}" type="datetime1">
               <a:rPr lang="en-US" smtClean="0"/>
               <a:pPr/>
-              <a:t>4/22/2020</a:t>
+              <a:t>4/23/2020</a:t>
             </a:fld>
             <a:endParaRPr lang="en-US"/>
           </a:p>
@@ -3219,7 +3225,7 @@
             <a:fld id="{AF334C04-7E06-41A0-9773-C171CC4D4F1A}" type="datetime1">
               <a:rPr lang="en-US" smtClean="0"/>
               <a:pPr/>
-              <a:t>4/22/2020</a:t>
+              <a:t>4/23/2020</a:t>
             </a:fld>
             <a:endParaRPr lang="en-US"/>
           </a:p>
@@ -3556,7 +3562,7 @@
             <a:fld id="{019087D4-E853-47D6-AA91-3F42132E2E98}" type="datetime1">
               <a:rPr lang="en-US" smtClean="0"/>
               <a:pPr/>
-              <a:t>4/22/2020</a:t>
+              <a:t>4/23/2020</a:t>
             </a:fld>
             <a:endParaRPr lang="en-US"/>
           </a:p>
@@ -3870,7 +3876,7 @@
             <a:fld id="{ADC8B20A-1B4C-454F-830A-180E52D8041D}" type="datetime1">
               <a:rPr lang="en-US" smtClean="0"/>
               <a:pPr/>
-              <a:t>4/22/2020</a:t>
+              <a:t>4/23/2020</a:t>
             </a:fld>
             <a:endParaRPr lang="en-US"/>
           </a:p>
@@ -4191,7 +4197,7 @@
           <a:p>
             <a:fld id="{3FEB07C9-5614-4780-8827-60A98C34F9C3}" type="datetime1">
               <a:rPr lang="en-US" smtClean="0"/>
-              <a:t>4/22/2020</a:t>
+              <a:t>4/23/2020</a:t>
             </a:fld>
             <a:endParaRPr lang="en-US"/>
           </a:p>
@@ -4783,13 +4789,13 @@
   <p:clrMapOvr>
     <a:masterClrMapping/>
   </p:clrMapOvr>
-  <mc:AlternateContent xmlns:mc="http://schemas.openxmlformats.org/markup-compatibility/2006" xmlns:p14="http://schemas.microsoft.com/office/powerpoint/2010/main">
-    <mc:Choice Requires="p14">
+  <mc:AlternateContent xmlns:mc="http://schemas.openxmlformats.org/markup-compatibility/2006">
+    <mc:Choice xmlns:p14="http://schemas.microsoft.com/office/powerpoint/2010/main" Requires="p14">
       <p:transition spd="med" p14:dur="700">
         <p:fade/>
       </p:transition>
     </mc:Choice>
-    <mc:Fallback xmlns="">
+    <mc:Fallback>
       <p:transition spd="med">
         <p:fade/>
       </p:transition>
@@ -4944,6 +4950,18 @@
   <p:clrMapOvr>
     <a:masterClrMapping/>
   </p:clrMapOvr>
+  <mc:AlternateContent xmlns:mc="http://schemas.openxmlformats.org/markup-compatibility/2006">
+    <mc:Choice xmlns:p14="http://schemas.microsoft.com/office/powerpoint/2010/main" Requires="p14">
+      <p:transition spd="med" p14:dur="700">
+        <p:fade/>
+      </p:transition>
+    </mc:Choice>
+    <mc:Fallback>
+      <p:transition spd="med">
+        <p:fade/>
+      </p:transition>
+    </mc:Fallback>
+  </mc:AlternateContent>
 </p:sld>
 </file>
 
@@ -5129,6 +5147,18 @@
   <p:clrMapOvr>
     <a:masterClrMapping/>
   </p:clrMapOvr>
+  <mc:AlternateContent xmlns:mc="http://schemas.openxmlformats.org/markup-compatibility/2006">
+    <mc:Choice xmlns:p14="http://schemas.microsoft.com/office/powerpoint/2010/main" Requires="p14">
+      <p:transition spd="med" p14:dur="700">
+        <p:fade/>
+      </p:transition>
+    </mc:Choice>
+    <mc:Fallback>
+      <p:transition spd="med">
+        <p:fade/>
+      </p:transition>
+    </mc:Fallback>
+  </mc:AlternateContent>
 </p:sld>
 </file>
 
@@ -5193,14 +5223,14 @@
             <p:ph idx="1"/>
             <p:extLst>
               <p:ext uri="{D42A27DB-BD31-4B8C-83A1-F6EECF244321}">
-                <p14:modId xmlns:p14="http://schemas.microsoft.com/office/powerpoint/2010/main" val="2769947856"/>
+                <p14:modId xmlns:p14="http://schemas.microsoft.com/office/powerpoint/2010/main" val="3176209959"/>
               </p:ext>
             </p:extLst>
           </p:nvPr>
         </p:nvGraphicFramePr>
         <p:xfrm>
-          <a:off x="368517" y="2226696"/>
-          <a:ext cx="11454965" cy="3593645"/>
+          <a:off x="650276" y="2226696"/>
+          <a:ext cx="10891448" cy="3593645"/>
         </p:xfrm>
         <a:graphic>
           <a:graphicData uri="http://schemas.openxmlformats.org/drawingml/2006/table">
@@ -5209,35 +5239,35 @@
                 <a:tableStyleId>{5C22544A-7EE6-4342-B048-85BDC9FD1C3A}</a:tableStyleId>
               </a:tblPr>
               <a:tblGrid>
-                <a:gridCol w="3387039">
+                <a:gridCol w="3220416">
                   <a:extLst>
                     <a:ext uri="{9D8B030D-6E8A-4147-A177-3AD203B41FA5}">
                       <a16:colId xmlns:a16="http://schemas.microsoft.com/office/drawing/2014/main" val="1362067105"/>
                     </a:ext>
                   </a:extLst>
                 </a:gridCol>
-                <a:gridCol w="2215123">
+                <a:gridCol w="2106151">
                   <a:extLst>
                     <a:ext uri="{9D8B030D-6E8A-4147-A177-3AD203B41FA5}">
                       <a16:colId xmlns:a16="http://schemas.microsoft.com/office/drawing/2014/main" val="2880734857"/>
                     </a:ext>
                   </a:extLst>
                 </a:gridCol>
-                <a:gridCol w="2194801">
+                <a:gridCol w="2086829">
                   <a:extLst>
                     <a:ext uri="{9D8B030D-6E8A-4147-A177-3AD203B41FA5}">
                       <a16:colId xmlns:a16="http://schemas.microsoft.com/office/drawing/2014/main" val="544060563"/>
                     </a:ext>
                   </a:extLst>
                 </a:gridCol>
-                <a:gridCol w="1829001">
+                <a:gridCol w="1739026">
                   <a:extLst>
                     <a:ext uri="{9D8B030D-6E8A-4147-A177-3AD203B41FA5}">
                       <a16:colId xmlns:a16="http://schemas.microsoft.com/office/drawing/2014/main" val="4198514732"/>
                     </a:ext>
                   </a:extLst>
                 </a:gridCol>
-                <a:gridCol w="1829001">
+                <a:gridCol w="1739026">
                   <a:extLst>
                     <a:ext uri="{9D8B030D-6E8A-4147-A177-3AD203B41FA5}">
                       <a16:colId xmlns:a16="http://schemas.microsoft.com/office/drawing/2014/main" val="2362467250"/>
@@ -5251,7 +5281,7 @@
                     <a:bodyPr/>
                     <a:lstStyle/>
                     <a:p>
-                      <a:endParaRPr lang="en-US" sz="2300">
+                      <a:endParaRPr lang="en-US" sz="2300" dirty="0">
                         <a:effectLst/>
                         <a:latin typeface="Calibri" panose="020F0502020204030204" pitchFamily="34" charset="0"/>
                         <a:cs typeface="Times New Roman" panose="02020603050405020304" pitchFamily="18" charset="0"/>
@@ -6597,6 +6627,178 @@
           </a:p>
         </p:txBody>
       </p:sp>
+      <p:cxnSp>
+        <p:nvCxnSpPr>
+          <p:cNvPr id="6" name="Straight Arrow Connector 5">
+            <a:extLst>
+              <a:ext uri="{FF2B5EF4-FFF2-40B4-BE49-F238E27FC236}">
+                <a16:creationId xmlns:a16="http://schemas.microsoft.com/office/drawing/2014/main" id="{117E0833-93CD-4C3E-869F-B91D1DD2A39B}"/>
+              </a:ext>
+            </a:extLst>
+          </p:cNvPr>
+          <p:cNvCxnSpPr>
+            <a:cxnSpLocks/>
+          </p:cNvCxnSpPr>
+          <p:nvPr/>
+        </p:nvCxnSpPr>
+        <p:spPr>
+          <a:xfrm flipH="1">
+            <a:off x="11541724" y="5674381"/>
+            <a:ext cx="650276" cy="0"/>
+          </a:xfrm>
+          <a:prstGeom prst="straightConnector1">
+            <a:avLst/>
+          </a:prstGeom>
+          <a:ln w="165100">
+            <a:solidFill>
+              <a:schemeClr val="tx1"/>
+            </a:solidFill>
+            <a:tailEnd type="triangle"/>
+          </a:ln>
+        </p:spPr>
+        <p:style>
+          <a:lnRef idx="1">
+            <a:schemeClr val="accent1"/>
+          </a:lnRef>
+          <a:fillRef idx="0">
+            <a:schemeClr val="accent1"/>
+          </a:fillRef>
+          <a:effectRef idx="0">
+            <a:schemeClr val="accent1"/>
+          </a:effectRef>
+          <a:fontRef idx="minor">
+            <a:schemeClr val="tx1"/>
+          </a:fontRef>
+        </p:style>
+      </p:cxnSp>
+      <p:cxnSp>
+        <p:nvCxnSpPr>
+          <p:cNvPr id="7" name="Straight Arrow Connector 6">
+            <a:extLst>
+              <a:ext uri="{FF2B5EF4-FFF2-40B4-BE49-F238E27FC236}">
+                <a16:creationId xmlns:a16="http://schemas.microsoft.com/office/drawing/2014/main" id="{A9825B08-98A4-42F1-B4A7-B00A014C10D8}"/>
+              </a:ext>
+            </a:extLst>
+          </p:cNvPr>
+          <p:cNvCxnSpPr>
+            <a:cxnSpLocks/>
+          </p:cNvCxnSpPr>
+          <p:nvPr/>
+        </p:nvCxnSpPr>
+        <p:spPr>
+          <a:xfrm flipH="1">
+            <a:off x="11541724" y="5239483"/>
+            <a:ext cx="650276" cy="0"/>
+          </a:xfrm>
+          <a:prstGeom prst="straightConnector1">
+            <a:avLst/>
+          </a:prstGeom>
+          <a:ln w="165100">
+            <a:solidFill>
+              <a:schemeClr val="tx1"/>
+            </a:solidFill>
+            <a:tailEnd type="triangle"/>
+          </a:ln>
+        </p:spPr>
+        <p:style>
+          <a:lnRef idx="1">
+            <a:schemeClr val="accent1"/>
+          </a:lnRef>
+          <a:fillRef idx="0">
+            <a:schemeClr val="accent1"/>
+          </a:fillRef>
+          <a:effectRef idx="0">
+            <a:schemeClr val="accent1"/>
+          </a:effectRef>
+          <a:fontRef idx="minor">
+            <a:schemeClr val="tx1"/>
+          </a:fontRef>
+        </p:style>
+      </p:cxnSp>
+      <p:cxnSp>
+        <p:nvCxnSpPr>
+          <p:cNvPr id="9" name="Straight Arrow Connector 8">
+            <a:extLst>
+              <a:ext uri="{FF2B5EF4-FFF2-40B4-BE49-F238E27FC236}">
+                <a16:creationId xmlns:a16="http://schemas.microsoft.com/office/drawing/2014/main" id="{3DA58E03-C117-403C-9DA8-E3CD96D6D08F}"/>
+              </a:ext>
+            </a:extLst>
+          </p:cNvPr>
+          <p:cNvCxnSpPr/>
+          <p:nvPr/>
+        </p:nvCxnSpPr>
+        <p:spPr>
+          <a:xfrm>
+            <a:off x="7032123" y="1356901"/>
+            <a:ext cx="0" cy="869795"/>
+          </a:xfrm>
+          <a:prstGeom prst="straightConnector1">
+            <a:avLst/>
+          </a:prstGeom>
+          <a:ln w="165100">
+            <a:solidFill>
+              <a:schemeClr val="tx1"/>
+            </a:solidFill>
+            <a:tailEnd type="triangle"/>
+          </a:ln>
+        </p:spPr>
+        <p:style>
+          <a:lnRef idx="1">
+            <a:schemeClr val="accent1"/>
+          </a:lnRef>
+          <a:fillRef idx="0">
+            <a:schemeClr val="accent1"/>
+          </a:fillRef>
+          <a:effectRef idx="0">
+            <a:schemeClr val="accent1"/>
+          </a:effectRef>
+          <a:fontRef idx="minor">
+            <a:schemeClr val="tx1"/>
+          </a:fontRef>
+        </p:style>
+      </p:cxnSp>
+      <p:cxnSp>
+        <p:nvCxnSpPr>
+          <p:cNvPr id="10" name="Straight Arrow Connector 9">
+            <a:extLst>
+              <a:ext uri="{FF2B5EF4-FFF2-40B4-BE49-F238E27FC236}">
+                <a16:creationId xmlns:a16="http://schemas.microsoft.com/office/drawing/2014/main" id="{2F718CFC-C837-49DD-94A1-8E3670846533}"/>
+              </a:ext>
+            </a:extLst>
+          </p:cNvPr>
+          <p:cNvCxnSpPr/>
+          <p:nvPr/>
+        </p:nvCxnSpPr>
+        <p:spPr>
+          <a:xfrm>
+            <a:off x="10659494" y="1356901"/>
+            <a:ext cx="0" cy="869795"/>
+          </a:xfrm>
+          <a:prstGeom prst="straightConnector1">
+            <a:avLst/>
+          </a:prstGeom>
+          <a:ln w="165100">
+            <a:solidFill>
+              <a:schemeClr val="tx1"/>
+            </a:solidFill>
+            <a:tailEnd type="triangle"/>
+          </a:ln>
+        </p:spPr>
+        <p:style>
+          <a:lnRef idx="1">
+            <a:schemeClr val="accent1"/>
+          </a:lnRef>
+          <a:fillRef idx="0">
+            <a:schemeClr val="accent1"/>
+          </a:fillRef>
+          <a:effectRef idx="0">
+            <a:schemeClr val="accent1"/>
+          </a:effectRef>
+          <a:fontRef idx="minor">
+            <a:schemeClr val="tx1"/>
+          </a:fontRef>
+        </p:style>
+      </p:cxnSp>
     </p:spTree>
     <p:extLst>
       <p:ext uri="{BB962C8B-B14F-4D97-AF65-F5344CB8AC3E}">
@@ -6607,6 +6809,517 @@
   <p:clrMapOvr>
     <a:masterClrMapping/>
   </p:clrMapOvr>
+  <mc:AlternateContent xmlns:mc="http://schemas.openxmlformats.org/markup-compatibility/2006">
+    <mc:Choice xmlns:p14="http://schemas.microsoft.com/office/powerpoint/2010/main" Requires="p14">
+      <p:transition spd="med" p14:dur="700">
+        <p:fade/>
+      </p:transition>
+    </mc:Choice>
+    <mc:Fallback>
+      <p:transition spd="med">
+        <p:fade/>
+      </p:transition>
+    </mc:Fallback>
+  </mc:AlternateContent>
+  <p:timing>
+    <p:tnLst>
+      <p:par>
+        <p:cTn id="1" dur="indefinite" restart="never" nodeType="tmRoot">
+          <p:childTnLst>
+            <p:seq concurrent="1" nextAc="seek">
+              <p:cTn id="2" dur="indefinite" nodeType="mainSeq">
+                <p:childTnLst>
+                  <p:par>
+                    <p:cTn id="3" fill="hold">
+                      <p:stCondLst>
+                        <p:cond delay="indefinite"/>
+                      </p:stCondLst>
+                      <p:childTnLst>
+                        <p:par>
+                          <p:cTn id="4" fill="hold">
+                            <p:stCondLst>
+                              <p:cond delay="0"/>
+                            </p:stCondLst>
+                            <p:childTnLst>
+                              <p:par>
+                                <p:cTn id="5" presetID="2" presetClass="entr" presetSubtype="2" fill="hold" nodeType="clickEffect">
+                                  <p:stCondLst>
+                                    <p:cond delay="0"/>
+                                  </p:stCondLst>
+                                  <p:childTnLst>
+                                    <p:set>
+                                      <p:cBhvr>
+                                        <p:cTn id="6" dur="1" fill="hold">
+                                          <p:stCondLst>
+                                            <p:cond delay="0"/>
+                                          </p:stCondLst>
+                                        </p:cTn>
+                                        <p:tgtEl>
+                                          <p:spTgt spid="6"/>
+                                        </p:tgtEl>
+                                        <p:attrNameLst>
+                                          <p:attrName>style.visibility</p:attrName>
+                                        </p:attrNameLst>
+                                      </p:cBhvr>
+                                      <p:to>
+                                        <p:strVal val="visible"/>
+                                      </p:to>
+                                    </p:set>
+                                    <p:anim calcmode="lin" valueType="num">
+                                      <p:cBhvr additive="base">
+                                        <p:cTn id="7" dur="500" fill="hold"/>
+                                        <p:tgtEl>
+                                          <p:spTgt spid="6"/>
+                                        </p:tgtEl>
+                                        <p:attrNameLst>
+                                          <p:attrName>ppt_x</p:attrName>
+                                        </p:attrNameLst>
+                                      </p:cBhvr>
+                                      <p:tavLst>
+                                        <p:tav tm="0">
+                                          <p:val>
+                                            <p:strVal val="1+#ppt_w/2"/>
+                                          </p:val>
+                                        </p:tav>
+                                        <p:tav tm="100000">
+                                          <p:val>
+                                            <p:strVal val="#ppt_x"/>
+                                          </p:val>
+                                        </p:tav>
+                                      </p:tavLst>
+                                    </p:anim>
+                                    <p:anim calcmode="lin" valueType="num">
+                                      <p:cBhvr additive="base">
+                                        <p:cTn id="8" dur="500" fill="hold"/>
+                                        <p:tgtEl>
+                                          <p:spTgt spid="6"/>
+                                        </p:tgtEl>
+                                        <p:attrNameLst>
+                                          <p:attrName>ppt_y</p:attrName>
+                                        </p:attrNameLst>
+                                      </p:cBhvr>
+                                      <p:tavLst>
+                                        <p:tav tm="0">
+                                          <p:val>
+                                            <p:strVal val="#ppt_y"/>
+                                          </p:val>
+                                        </p:tav>
+                                        <p:tav tm="100000">
+                                          <p:val>
+                                            <p:strVal val="#ppt_y"/>
+                                          </p:val>
+                                        </p:tav>
+                                      </p:tavLst>
+                                    </p:anim>
+                                  </p:childTnLst>
+                                </p:cTn>
+                              </p:par>
+                            </p:childTnLst>
+                          </p:cTn>
+                        </p:par>
+                      </p:childTnLst>
+                    </p:cTn>
+                  </p:par>
+                  <p:par>
+                    <p:cTn id="9" fill="hold">
+                      <p:stCondLst>
+                        <p:cond delay="indefinite"/>
+                      </p:stCondLst>
+                      <p:childTnLst>
+                        <p:par>
+                          <p:cTn id="10" fill="hold">
+                            <p:stCondLst>
+                              <p:cond delay="0"/>
+                            </p:stCondLst>
+                            <p:childTnLst>
+                              <p:par>
+                                <p:cTn id="11" presetID="2" presetClass="entr" presetSubtype="2" fill="hold" nodeType="clickEffect">
+                                  <p:stCondLst>
+                                    <p:cond delay="0"/>
+                                  </p:stCondLst>
+                                  <p:childTnLst>
+                                    <p:set>
+                                      <p:cBhvr>
+                                        <p:cTn id="12" dur="1" fill="hold">
+                                          <p:stCondLst>
+                                            <p:cond delay="0"/>
+                                          </p:stCondLst>
+                                        </p:cTn>
+                                        <p:tgtEl>
+                                          <p:spTgt spid="7"/>
+                                        </p:tgtEl>
+                                        <p:attrNameLst>
+                                          <p:attrName>style.visibility</p:attrName>
+                                        </p:attrNameLst>
+                                      </p:cBhvr>
+                                      <p:to>
+                                        <p:strVal val="visible"/>
+                                      </p:to>
+                                    </p:set>
+                                    <p:anim calcmode="lin" valueType="num">
+                                      <p:cBhvr additive="base">
+                                        <p:cTn id="13" dur="500" fill="hold"/>
+                                        <p:tgtEl>
+                                          <p:spTgt spid="7"/>
+                                        </p:tgtEl>
+                                        <p:attrNameLst>
+                                          <p:attrName>ppt_x</p:attrName>
+                                        </p:attrNameLst>
+                                      </p:cBhvr>
+                                      <p:tavLst>
+                                        <p:tav tm="0">
+                                          <p:val>
+                                            <p:strVal val="1+#ppt_w/2"/>
+                                          </p:val>
+                                        </p:tav>
+                                        <p:tav tm="100000">
+                                          <p:val>
+                                            <p:strVal val="#ppt_x"/>
+                                          </p:val>
+                                        </p:tav>
+                                      </p:tavLst>
+                                    </p:anim>
+                                    <p:anim calcmode="lin" valueType="num">
+                                      <p:cBhvr additive="base">
+                                        <p:cTn id="14" dur="500" fill="hold"/>
+                                        <p:tgtEl>
+                                          <p:spTgt spid="7"/>
+                                        </p:tgtEl>
+                                        <p:attrNameLst>
+                                          <p:attrName>ppt_y</p:attrName>
+                                        </p:attrNameLst>
+                                      </p:cBhvr>
+                                      <p:tavLst>
+                                        <p:tav tm="0">
+                                          <p:val>
+                                            <p:strVal val="#ppt_y"/>
+                                          </p:val>
+                                        </p:tav>
+                                        <p:tav tm="100000">
+                                          <p:val>
+                                            <p:strVal val="#ppt_y"/>
+                                          </p:val>
+                                        </p:tav>
+                                      </p:tavLst>
+                                    </p:anim>
+                                  </p:childTnLst>
+                                </p:cTn>
+                              </p:par>
+                              <p:par>
+                                <p:cTn id="15" presetID="10" presetClass="exit" presetSubtype="0" fill="hold" nodeType="withEffect">
+                                  <p:stCondLst>
+                                    <p:cond delay="0"/>
+                                  </p:stCondLst>
+                                  <p:childTnLst>
+                                    <p:animEffect transition="out" filter="fade">
+                                      <p:cBhvr>
+                                        <p:cTn id="16" dur="500"/>
+                                        <p:tgtEl>
+                                          <p:spTgt spid="6"/>
+                                        </p:tgtEl>
+                                      </p:cBhvr>
+                                    </p:animEffect>
+                                    <p:set>
+                                      <p:cBhvr>
+                                        <p:cTn id="17" dur="1" fill="hold">
+                                          <p:stCondLst>
+                                            <p:cond delay="499"/>
+                                          </p:stCondLst>
+                                        </p:cTn>
+                                        <p:tgtEl>
+                                          <p:spTgt spid="6"/>
+                                        </p:tgtEl>
+                                        <p:attrNameLst>
+                                          <p:attrName>style.visibility</p:attrName>
+                                        </p:attrNameLst>
+                                      </p:cBhvr>
+                                      <p:to>
+                                        <p:strVal val="hidden"/>
+                                      </p:to>
+                                    </p:set>
+                                  </p:childTnLst>
+                                </p:cTn>
+                              </p:par>
+                            </p:childTnLst>
+                          </p:cTn>
+                        </p:par>
+                      </p:childTnLst>
+                    </p:cTn>
+                  </p:par>
+                  <p:par>
+                    <p:cTn id="18" fill="hold">
+                      <p:stCondLst>
+                        <p:cond delay="indefinite"/>
+                      </p:stCondLst>
+                      <p:childTnLst>
+                        <p:par>
+                          <p:cTn id="19" fill="hold">
+                            <p:stCondLst>
+                              <p:cond delay="0"/>
+                            </p:stCondLst>
+                            <p:childTnLst>
+                              <p:par>
+                                <p:cTn id="20" presetID="2" presetClass="entr" presetSubtype="1" fill="hold" nodeType="clickEffect">
+                                  <p:stCondLst>
+                                    <p:cond delay="0"/>
+                                  </p:stCondLst>
+                                  <p:childTnLst>
+                                    <p:set>
+                                      <p:cBhvr>
+                                        <p:cTn id="21" dur="1" fill="hold">
+                                          <p:stCondLst>
+                                            <p:cond delay="0"/>
+                                          </p:stCondLst>
+                                        </p:cTn>
+                                        <p:tgtEl>
+                                          <p:spTgt spid="9"/>
+                                        </p:tgtEl>
+                                        <p:attrNameLst>
+                                          <p:attrName>style.visibility</p:attrName>
+                                        </p:attrNameLst>
+                                      </p:cBhvr>
+                                      <p:to>
+                                        <p:strVal val="visible"/>
+                                      </p:to>
+                                    </p:set>
+                                    <p:anim calcmode="lin" valueType="num">
+                                      <p:cBhvr additive="base">
+                                        <p:cTn id="22" dur="500" fill="hold"/>
+                                        <p:tgtEl>
+                                          <p:spTgt spid="9"/>
+                                        </p:tgtEl>
+                                        <p:attrNameLst>
+                                          <p:attrName>ppt_x</p:attrName>
+                                        </p:attrNameLst>
+                                      </p:cBhvr>
+                                      <p:tavLst>
+                                        <p:tav tm="0">
+                                          <p:val>
+                                            <p:strVal val="#ppt_x"/>
+                                          </p:val>
+                                        </p:tav>
+                                        <p:tav tm="100000">
+                                          <p:val>
+                                            <p:strVal val="#ppt_x"/>
+                                          </p:val>
+                                        </p:tav>
+                                      </p:tavLst>
+                                    </p:anim>
+                                    <p:anim calcmode="lin" valueType="num">
+                                      <p:cBhvr additive="base">
+                                        <p:cTn id="23" dur="500" fill="hold"/>
+                                        <p:tgtEl>
+                                          <p:spTgt spid="9"/>
+                                        </p:tgtEl>
+                                        <p:attrNameLst>
+                                          <p:attrName>ppt_y</p:attrName>
+                                        </p:attrNameLst>
+                                      </p:cBhvr>
+                                      <p:tavLst>
+                                        <p:tav tm="0">
+                                          <p:val>
+                                            <p:strVal val="0-#ppt_h/2"/>
+                                          </p:val>
+                                        </p:tav>
+                                        <p:tav tm="100000">
+                                          <p:val>
+                                            <p:strVal val="#ppt_y"/>
+                                          </p:val>
+                                        </p:tav>
+                                      </p:tavLst>
+                                    </p:anim>
+                                  </p:childTnLst>
+                                </p:cTn>
+                              </p:par>
+                              <p:par>
+                                <p:cTn id="24" presetID="10" presetClass="exit" presetSubtype="0" fill="hold" nodeType="withEffect">
+                                  <p:stCondLst>
+                                    <p:cond delay="0"/>
+                                  </p:stCondLst>
+                                  <p:childTnLst>
+                                    <p:animEffect transition="out" filter="fade">
+                                      <p:cBhvr>
+                                        <p:cTn id="25" dur="500"/>
+                                        <p:tgtEl>
+                                          <p:spTgt spid="7"/>
+                                        </p:tgtEl>
+                                      </p:cBhvr>
+                                    </p:animEffect>
+                                    <p:set>
+                                      <p:cBhvr>
+                                        <p:cTn id="26" dur="1" fill="hold">
+                                          <p:stCondLst>
+                                            <p:cond delay="499"/>
+                                          </p:stCondLst>
+                                        </p:cTn>
+                                        <p:tgtEl>
+                                          <p:spTgt spid="7"/>
+                                        </p:tgtEl>
+                                        <p:attrNameLst>
+                                          <p:attrName>style.visibility</p:attrName>
+                                        </p:attrNameLst>
+                                      </p:cBhvr>
+                                      <p:to>
+                                        <p:strVal val="hidden"/>
+                                      </p:to>
+                                    </p:set>
+                                  </p:childTnLst>
+                                </p:cTn>
+                              </p:par>
+                            </p:childTnLst>
+                          </p:cTn>
+                        </p:par>
+                      </p:childTnLst>
+                    </p:cTn>
+                  </p:par>
+                  <p:par>
+                    <p:cTn id="27" fill="hold">
+                      <p:stCondLst>
+                        <p:cond delay="indefinite"/>
+                      </p:stCondLst>
+                      <p:childTnLst>
+                        <p:par>
+                          <p:cTn id="28" fill="hold">
+                            <p:stCondLst>
+                              <p:cond delay="0"/>
+                            </p:stCondLst>
+                            <p:childTnLst>
+                              <p:par>
+                                <p:cTn id="29" presetID="2" presetClass="entr" presetSubtype="1" fill="hold" nodeType="clickEffect">
+                                  <p:stCondLst>
+                                    <p:cond delay="0"/>
+                                  </p:stCondLst>
+                                  <p:childTnLst>
+                                    <p:set>
+                                      <p:cBhvr>
+                                        <p:cTn id="30" dur="1" fill="hold">
+                                          <p:stCondLst>
+                                            <p:cond delay="0"/>
+                                          </p:stCondLst>
+                                        </p:cTn>
+                                        <p:tgtEl>
+                                          <p:spTgt spid="10"/>
+                                        </p:tgtEl>
+                                        <p:attrNameLst>
+                                          <p:attrName>style.visibility</p:attrName>
+                                        </p:attrNameLst>
+                                      </p:cBhvr>
+                                      <p:to>
+                                        <p:strVal val="visible"/>
+                                      </p:to>
+                                    </p:set>
+                                    <p:anim calcmode="lin" valueType="num">
+                                      <p:cBhvr additive="base">
+                                        <p:cTn id="31" dur="500" fill="hold"/>
+                                        <p:tgtEl>
+                                          <p:spTgt spid="10"/>
+                                        </p:tgtEl>
+                                        <p:attrNameLst>
+                                          <p:attrName>ppt_x</p:attrName>
+                                        </p:attrNameLst>
+                                      </p:cBhvr>
+                                      <p:tavLst>
+                                        <p:tav tm="0">
+                                          <p:val>
+                                            <p:strVal val="#ppt_x"/>
+                                          </p:val>
+                                        </p:tav>
+                                        <p:tav tm="100000">
+                                          <p:val>
+                                            <p:strVal val="#ppt_x"/>
+                                          </p:val>
+                                        </p:tav>
+                                      </p:tavLst>
+                                    </p:anim>
+                                    <p:anim calcmode="lin" valueType="num">
+                                      <p:cBhvr additive="base">
+                                        <p:cTn id="32" dur="500" fill="hold"/>
+                                        <p:tgtEl>
+                                          <p:spTgt spid="10"/>
+                                        </p:tgtEl>
+                                        <p:attrNameLst>
+                                          <p:attrName>ppt_y</p:attrName>
+                                        </p:attrNameLst>
+                                      </p:cBhvr>
+                                      <p:tavLst>
+                                        <p:tav tm="0">
+                                          <p:val>
+                                            <p:strVal val="0-#ppt_h/2"/>
+                                          </p:val>
+                                        </p:tav>
+                                        <p:tav tm="100000">
+                                          <p:val>
+                                            <p:strVal val="#ppt_y"/>
+                                          </p:val>
+                                        </p:tav>
+                                      </p:tavLst>
+                                    </p:anim>
+                                  </p:childTnLst>
+                                </p:cTn>
+                              </p:par>
+                              <p:par>
+                                <p:cTn id="33" presetID="10" presetClass="exit" presetSubtype="0" fill="hold" nodeType="withEffect">
+                                  <p:stCondLst>
+                                    <p:cond delay="0"/>
+                                  </p:stCondLst>
+                                  <p:childTnLst>
+                                    <p:animEffect transition="out" filter="fade">
+                                      <p:cBhvr>
+                                        <p:cTn id="34" dur="500"/>
+                                        <p:tgtEl>
+                                          <p:spTgt spid="9"/>
+                                        </p:tgtEl>
+                                      </p:cBhvr>
+                                    </p:animEffect>
+                                    <p:set>
+                                      <p:cBhvr>
+                                        <p:cTn id="35" dur="1" fill="hold">
+                                          <p:stCondLst>
+                                            <p:cond delay="499"/>
+                                          </p:stCondLst>
+                                        </p:cTn>
+                                        <p:tgtEl>
+                                          <p:spTgt spid="9"/>
+                                        </p:tgtEl>
+                                        <p:attrNameLst>
+                                          <p:attrName>style.visibility</p:attrName>
+                                        </p:attrNameLst>
+                                      </p:cBhvr>
+                                      <p:to>
+                                        <p:strVal val="hidden"/>
+                                      </p:to>
+                                    </p:set>
+                                  </p:childTnLst>
+                                </p:cTn>
+                              </p:par>
+                            </p:childTnLst>
+                          </p:cTn>
+                        </p:par>
+                      </p:childTnLst>
+                    </p:cTn>
+                  </p:par>
+                </p:childTnLst>
+              </p:cTn>
+              <p:prevCondLst>
+                <p:cond evt="onPrev" delay="0">
+                  <p:tgtEl>
+                    <p:sldTgt/>
+                  </p:tgtEl>
+                </p:cond>
+              </p:prevCondLst>
+              <p:nextCondLst>
+                <p:cond evt="onNext" delay="0">
+                  <p:tgtEl>
+                    <p:sldTgt/>
+                  </p:tgtEl>
+                </p:cond>
+              </p:nextCondLst>
+            </p:seq>
+          </p:childTnLst>
+        </p:cTn>
+      </p:par>
+    </p:tnLst>
+  </p:timing>
 </p:sld>
 </file>
 
@@ -8409,6 +9122,218 @@
           </a:graphicData>
         </a:graphic>
       </p:graphicFrame>
+      <p:cxnSp>
+        <p:nvCxnSpPr>
+          <p:cNvPr id="5" name="Straight Arrow Connector 4">
+            <a:extLst>
+              <a:ext uri="{FF2B5EF4-FFF2-40B4-BE49-F238E27FC236}">
+                <a16:creationId xmlns:a16="http://schemas.microsoft.com/office/drawing/2014/main" id="{EACB9EE4-94D4-4F49-83A6-8CB76B3F8C7D}"/>
+              </a:ext>
+            </a:extLst>
+          </p:cNvPr>
+          <p:cNvCxnSpPr>
+            <a:cxnSpLocks/>
+          </p:cNvCxnSpPr>
+          <p:nvPr/>
+        </p:nvCxnSpPr>
+        <p:spPr>
+          <a:xfrm flipH="1">
+            <a:off x="11639086" y="4805324"/>
+            <a:ext cx="552914" cy="0"/>
+          </a:xfrm>
+          <a:prstGeom prst="straightConnector1">
+            <a:avLst/>
+          </a:prstGeom>
+          <a:ln w="165100">
+            <a:solidFill>
+              <a:schemeClr val="tx1"/>
+            </a:solidFill>
+            <a:tailEnd type="triangle"/>
+          </a:ln>
+        </p:spPr>
+        <p:style>
+          <a:lnRef idx="1">
+            <a:schemeClr val="accent1"/>
+          </a:lnRef>
+          <a:fillRef idx="0">
+            <a:schemeClr val="accent1"/>
+          </a:fillRef>
+          <a:effectRef idx="0">
+            <a:schemeClr val="accent1"/>
+          </a:effectRef>
+          <a:fontRef idx="minor">
+            <a:schemeClr val="tx1"/>
+          </a:fontRef>
+        </p:style>
+      </p:cxnSp>
+      <p:cxnSp>
+        <p:nvCxnSpPr>
+          <p:cNvPr id="7" name="Straight Arrow Connector 6">
+            <a:extLst>
+              <a:ext uri="{FF2B5EF4-FFF2-40B4-BE49-F238E27FC236}">
+                <a16:creationId xmlns:a16="http://schemas.microsoft.com/office/drawing/2014/main" id="{B07AE22B-1D92-4E00-AB79-24D3217E81B3}"/>
+              </a:ext>
+            </a:extLst>
+          </p:cNvPr>
+          <p:cNvCxnSpPr/>
+          <p:nvPr/>
+        </p:nvCxnSpPr>
+        <p:spPr>
+          <a:xfrm>
+            <a:off x="6047190" y="1987275"/>
+            <a:ext cx="0" cy="869795"/>
+          </a:xfrm>
+          <a:prstGeom prst="straightConnector1">
+            <a:avLst/>
+          </a:prstGeom>
+          <a:ln w="165100">
+            <a:solidFill>
+              <a:schemeClr val="tx1"/>
+            </a:solidFill>
+            <a:tailEnd type="triangle"/>
+          </a:ln>
+        </p:spPr>
+        <p:style>
+          <a:lnRef idx="1">
+            <a:schemeClr val="accent1"/>
+          </a:lnRef>
+          <a:fillRef idx="0">
+            <a:schemeClr val="accent1"/>
+          </a:fillRef>
+          <a:effectRef idx="0">
+            <a:schemeClr val="accent1"/>
+          </a:effectRef>
+          <a:fontRef idx="minor">
+            <a:schemeClr val="tx1"/>
+          </a:fontRef>
+        </p:style>
+      </p:cxnSp>
+      <p:cxnSp>
+        <p:nvCxnSpPr>
+          <p:cNvPr id="9" name="Straight Arrow Connector 8">
+            <a:extLst>
+              <a:ext uri="{FF2B5EF4-FFF2-40B4-BE49-F238E27FC236}">
+                <a16:creationId xmlns:a16="http://schemas.microsoft.com/office/drawing/2014/main" id="{D4105A88-D762-46A7-9765-328F2E3D9DDF}"/>
+              </a:ext>
+            </a:extLst>
+          </p:cNvPr>
+          <p:cNvCxnSpPr/>
+          <p:nvPr/>
+        </p:nvCxnSpPr>
+        <p:spPr>
+          <a:xfrm>
+            <a:off x="8966721" y="1987275"/>
+            <a:ext cx="0" cy="869795"/>
+          </a:xfrm>
+          <a:prstGeom prst="straightConnector1">
+            <a:avLst/>
+          </a:prstGeom>
+          <a:ln w="165100">
+            <a:solidFill>
+              <a:schemeClr val="tx1"/>
+            </a:solidFill>
+            <a:tailEnd type="triangle"/>
+          </a:ln>
+        </p:spPr>
+        <p:style>
+          <a:lnRef idx="1">
+            <a:schemeClr val="accent1"/>
+          </a:lnRef>
+          <a:fillRef idx="0">
+            <a:schemeClr val="accent1"/>
+          </a:fillRef>
+          <a:effectRef idx="0">
+            <a:schemeClr val="accent1"/>
+          </a:effectRef>
+          <a:fontRef idx="minor">
+            <a:schemeClr val="tx1"/>
+          </a:fontRef>
+        </p:style>
+      </p:cxnSp>
+      <p:cxnSp>
+        <p:nvCxnSpPr>
+          <p:cNvPr id="10" name="Straight Arrow Connector 9">
+            <a:extLst>
+              <a:ext uri="{FF2B5EF4-FFF2-40B4-BE49-F238E27FC236}">
+                <a16:creationId xmlns:a16="http://schemas.microsoft.com/office/drawing/2014/main" id="{41D12DF7-5C26-4AA9-9932-2FC0484B3462}"/>
+              </a:ext>
+            </a:extLst>
+          </p:cNvPr>
+          <p:cNvCxnSpPr/>
+          <p:nvPr/>
+        </p:nvCxnSpPr>
+        <p:spPr>
+          <a:xfrm>
+            <a:off x="11044902" y="1987275"/>
+            <a:ext cx="0" cy="869795"/>
+          </a:xfrm>
+          <a:prstGeom prst="straightConnector1">
+            <a:avLst/>
+          </a:prstGeom>
+          <a:ln w="165100">
+            <a:solidFill>
+              <a:schemeClr val="tx1"/>
+            </a:solidFill>
+            <a:tailEnd type="triangle"/>
+          </a:ln>
+        </p:spPr>
+        <p:style>
+          <a:lnRef idx="1">
+            <a:schemeClr val="accent1"/>
+          </a:lnRef>
+          <a:fillRef idx="0">
+            <a:schemeClr val="accent1"/>
+          </a:fillRef>
+          <a:effectRef idx="0">
+            <a:schemeClr val="accent1"/>
+          </a:effectRef>
+          <a:fontRef idx="minor">
+            <a:schemeClr val="tx1"/>
+          </a:fontRef>
+        </p:style>
+      </p:cxnSp>
+      <p:cxnSp>
+        <p:nvCxnSpPr>
+          <p:cNvPr id="11" name="Straight Arrow Connector 10">
+            <a:extLst>
+              <a:ext uri="{FF2B5EF4-FFF2-40B4-BE49-F238E27FC236}">
+                <a16:creationId xmlns:a16="http://schemas.microsoft.com/office/drawing/2014/main" id="{B035E53A-3C17-40FB-9BE9-076949468476}"/>
+              </a:ext>
+            </a:extLst>
+          </p:cNvPr>
+          <p:cNvCxnSpPr/>
+          <p:nvPr/>
+        </p:nvCxnSpPr>
+        <p:spPr>
+          <a:xfrm>
+            <a:off x="10009591" y="1987275"/>
+            <a:ext cx="0" cy="869795"/>
+          </a:xfrm>
+          <a:prstGeom prst="straightConnector1">
+            <a:avLst/>
+          </a:prstGeom>
+          <a:ln w="165100">
+            <a:solidFill>
+              <a:schemeClr val="tx1"/>
+            </a:solidFill>
+            <a:tailEnd type="triangle"/>
+          </a:ln>
+        </p:spPr>
+        <p:style>
+          <a:lnRef idx="1">
+            <a:schemeClr val="accent1"/>
+          </a:lnRef>
+          <a:fillRef idx="0">
+            <a:schemeClr val="accent1"/>
+          </a:fillRef>
+          <a:effectRef idx="0">
+            <a:schemeClr val="accent1"/>
+          </a:effectRef>
+          <a:fontRef idx="minor">
+            <a:schemeClr val="tx1"/>
+          </a:fontRef>
+        </p:style>
+      </p:cxnSp>
     </p:spTree>
     <p:extLst>
       <p:ext uri="{BB962C8B-B14F-4D97-AF65-F5344CB8AC3E}">
@@ -8419,6 +9344,643 @@
   <p:clrMapOvr>
     <a:masterClrMapping/>
   </p:clrMapOvr>
+  <mc:AlternateContent xmlns:mc="http://schemas.openxmlformats.org/markup-compatibility/2006">
+    <mc:Choice xmlns:p14="http://schemas.microsoft.com/office/powerpoint/2010/main" Requires="p14">
+      <p:transition spd="med" p14:dur="700">
+        <p:fade/>
+      </p:transition>
+    </mc:Choice>
+    <mc:Fallback>
+      <p:transition spd="med">
+        <p:fade/>
+      </p:transition>
+    </mc:Fallback>
+  </mc:AlternateContent>
+  <p:timing>
+    <p:tnLst>
+      <p:par>
+        <p:cTn id="1" dur="indefinite" restart="never" nodeType="tmRoot">
+          <p:childTnLst>
+            <p:seq concurrent="1" nextAc="seek">
+              <p:cTn id="2" dur="indefinite" nodeType="mainSeq">
+                <p:childTnLst>
+                  <p:par>
+                    <p:cTn id="3" fill="hold">
+                      <p:stCondLst>
+                        <p:cond delay="indefinite"/>
+                      </p:stCondLst>
+                      <p:childTnLst>
+                        <p:par>
+                          <p:cTn id="4" fill="hold">
+                            <p:stCondLst>
+                              <p:cond delay="0"/>
+                            </p:stCondLst>
+                            <p:childTnLst>
+                              <p:par>
+                                <p:cTn id="5" presetID="2" presetClass="entr" presetSubtype="2" fill="hold" nodeType="clickEffect">
+                                  <p:stCondLst>
+                                    <p:cond delay="0"/>
+                                  </p:stCondLst>
+                                  <p:childTnLst>
+                                    <p:set>
+                                      <p:cBhvr>
+                                        <p:cTn id="6" dur="1" fill="hold">
+                                          <p:stCondLst>
+                                            <p:cond delay="0"/>
+                                          </p:stCondLst>
+                                        </p:cTn>
+                                        <p:tgtEl>
+                                          <p:spTgt spid="5"/>
+                                        </p:tgtEl>
+                                        <p:attrNameLst>
+                                          <p:attrName>style.visibility</p:attrName>
+                                        </p:attrNameLst>
+                                      </p:cBhvr>
+                                      <p:to>
+                                        <p:strVal val="visible"/>
+                                      </p:to>
+                                    </p:set>
+                                    <p:anim calcmode="lin" valueType="num">
+                                      <p:cBhvr additive="base">
+                                        <p:cTn id="7" dur="500" fill="hold"/>
+                                        <p:tgtEl>
+                                          <p:spTgt spid="5"/>
+                                        </p:tgtEl>
+                                        <p:attrNameLst>
+                                          <p:attrName>ppt_x</p:attrName>
+                                        </p:attrNameLst>
+                                      </p:cBhvr>
+                                      <p:tavLst>
+                                        <p:tav tm="0">
+                                          <p:val>
+                                            <p:strVal val="1+#ppt_w/2"/>
+                                          </p:val>
+                                        </p:tav>
+                                        <p:tav tm="100000">
+                                          <p:val>
+                                            <p:strVal val="#ppt_x"/>
+                                          </p:val>
+                                        </p:tav>
+                                      </p:tavLst>
+                                    </p:anim>
+                                    <p:anim calcmode="lin" valueType="num">
+                                      <p:cBhvr additive="base">
+                                        <p:cTn id="8" dur="500" fill="hold"/>
+                                        <p:tgtEl>
+                                          <p:spTgt spid="5"/>
+                                        </p:tgtEl>
+                                        <p:attrNameLst>
+                                          <p:attrName>ppt_y</p:attrName>
+                                        </p:attrNameLst>
+                                      </p:cBhvr>
+                                      <p:tavLst>
+                                        <p:tav tm="0">
+                                          <p:val>
+                                            <p:strVal val="#ppt_y"/>
+                                          </p:val>
+                                        </p:tav>
+                                        <p:tav tm="100000">
+                                          <p:val>
+                                            <p:strVal val="#ppt_y"/>
+                                          </p:val>
+                                        </p:tav>
+                                      </p:tavLst>
+                                    </p:anim>
+                                  </p:childTnLst>
+                                </p:cTn>
+                              </p:par>
+                            </p:childTnLst>
+                          </p:cTn>
+                        </p:par>
+                      </p:childTnLst>
+                    </p:cTn>
+                  </p:par>
+                  <p:par>
+                    <p:cTn id="9" fill="hold">
+                      <p:stCondLst>
+                        <p:cond delay="indefinite"/>
+                      </p:stCondLst>
+                      <p:childTnLst>
+                        <p:par>
+                          <p:cTn id="10" fill="hold">
+                            <p:stCondLst>
+                              <p:cond delay="0"/>
+                            </p:stCondLst>
+                            <p:childTnLst>
+                              <p:par>
+                                <p:cTn id="11" presetID="2" presetClass="entr" presetSubtype="1" fill="hold" nodeType="clickEffect">
+                                  <p:stCondLst>
+                                    <p:cond delay="0"/>
+                                  </p:stCondLst>
+                                  <p:childTnLst>
+                                    <p:set>
+                                      <p:cBhvr>
+                                        <p:cTn id="12" dur="1" fill="hold">
+                                          <p:stCondLst>
+                                            <p:cond delay="0"/>
+                                          </p:stCondLst>
+                                        </p:cTn>
+                                        <p:tgtEl>
+                                          <p:spTgt spid="7"/>
+                                        </p:tgtEl>
+                                        <p:attrNameLst>
+                                          <p:attrName>style.visibility</p:attrName>
+                                        </p:attrNameLst>
+                                      </p:cBhvr>
+                                      <p:to>
+                                        <p:strVal val="visible"/>
+                                      </p:to>
+                                    </p:set>
+                                    <p:anim calcmode="lin" valueType="num">
+                                      <p:cBhvr additive="base">
+                                        <p:cTn id="13" dur="500" fill="hold"/>
+                                        <p:tgtEl>
+                                          <p:spTgt spid="7"/>
+                                        </p:tgtEl>
+                                        <p:attrNameLst>
+                                          <p:attrName>ppt_x</p:attrName>
+                                        </p:attrNameLst>
+                                      </p:cBhvr>
+                                      <p:tavLst>
+                                        <p:tav tm="0">
+                                          <p:val>
+                                            <p:strVal val="#ppt_x"/>
+                                          </p:val>
+                                        </p:tav>
+                                        <p:tav tm="100000">
+                                          <p:val>
+                                            <p:strVal val="#ppt_x"/>
+                                          </p:val>
+                                        </p:tav>
+                                      </p:tavLst>
+                                    </p:anim>
+                                    <p:anim calcmode="lin" valueType="num">
+                                      <p:cBhvr additive="base">
+                                        <p:cTn id="14" dur="500" fill="hold"/>
+                                        <p:tgtEl>
+                                          <p:spTgt spid="7"/>
+                                        </p:tgtEl>
+                                        <p:attrNameLst>
+                                          <p:attrName>ppt_y</p:attrName>
+                                        </p:attrNameLst>
+                                      </p:cBhvr>
+                                      <p:tavLst>
+                                        <p:tav tm="0">
+                                          <p:val>
+                                            <p:strVal val="0-#ppt_h/2"/>
+                                          </p:val>
+                                        </p:tav>
+                                        <p:tav tm="100000">
+                                          <p:val>
+                                            <p:strVal val="#ppt_y"/>
+                                          </p:val>
+                                        </p:tav>
+                                      </p:tavLst>
+                                    </p:anim>
+                                  </p:childTnLst>
+                                </p:cTn>
+                              </p:par>
+                              <p:par>
+                                <p:cTn id="15" presetID="10" presetClass="exit" presetSubtype="0" fill="hold" nodeType="withEffect">
+                                  <p:stCondLst>
+                                    <p:cond delay="0"/>
+                                  </p:stCondLst>
+                                  <p:childTnLst>
+                                    <p:animEffect transition="out" filter="fade">
+                                      <p:cBhvr>
+                                        <p:cTn id="16" dur="500"/>
+                                        <p:tgtEl>
+                                          <p:spTgt spid="5"/>
+                                        </p:tgtEl>
+                                      </p:cBhvr>
+                                    </p:animEffect>
+                                    <p:set>
+                                      <p:cBhvr>
+                                        <p:cTn id="17" dur="1" fill="hold">
+                                          <p:stCondLst>
+                                            <p:cond delay="499"/>
+                                          </p:stCondLst>
+                                        </p:cTn>
+                                        <p:tgtEl>
+                                          <p:spTgt spid="5"/>
+                                        </p:tgtEl>
+                                        <p:attrNameLst>
+                                          <p:attrName>style.visibility</p:attrName>
+                                        </p:attrNameLst>
+                                      </p:cBhvr>
+                                      <p:to>
+                                        <p:strVal val="hidden"/>
+                                      </p:to>
+                                    </p:set>
+                                  </p:childTnLst>
+                                </p:cTn>
+                              </p:par>
+                            </p:childTnLst>
+                          </p:cTn>
+                        </p:par>
+                      </p:childTnLst>
+                    </p:cTn>
+                  </p:par>
+                  <p:par>
+                    <p:cTn id="18" fill="hold">
+                      <p:stCondLst>
+                        <p:cond delay="indefinite"/>
+                      </p:stCondLst>
+                      <p:childTnLst>
+                        <p:par>
+                          <p:cTn id="19" fill="hold">
+                            <p:stCondLst>
+                              <p:cond delay="0"/>
+                            </p:stCondLst>
+                            <p:childTnLst>
+                              <p:par>
+                                <p:cTn id="20" presetID="2" presetClass="entr" presetSubtype="1" fill="hold" nodeType="clickEffect">
+                                  <p:stCondLst>
+                                    <p:cond delay="0"/>
+                                  </p:stCondLst>
+                                  <p:childTnLst>
+                                    <p:set>
+                                      <p:cBhvr>
+                                        <p:cTn id="21" dur="1" fill="hold">
+                                          <p:stCondLst>
+                                            <p:cond delay="0"/>
+                                          </p:stCondLst>
+                                        </p:cTn>
+                                        <p:tgtEl>
+                                          <p:spTgt spid="9"/>
+                                        </p:tgtEl>
+                                        <p:attrNameLst>
+                                          <p:attrName>style.visibility</p:attrName>
+                                        </p:attrNameLst>
+                                      </p:cBhvr>
+                                      <p:to>
+                                        <p:strVal val="visible"/>
+                                      </p:to>
+                                    </p:set>
+                                    <p:anim calcmode="lin" valueType="num">
+                                      <p:cBhvr additive="base">
+                                        <p:cTn id="22" dur="500" fill="hold"/>
+                                        <p:tgtEl>
+                                          <p:spTgt spid="9"/>
+                                        </p:tgtEl>
+                                        <p:attrNameLst>
+                                          <p:attrName>ppt_x</p:attrName>
+                                        </p:attrNameLst>
+                                      </p:cBhvr>
+                                      <p:tavLst>
+                                        <p:tav tm="0">
+                                          <p:val>
+                                            <p:strVal val="#ppt_x"/>
+                                          </p:val>
+                                        </p:tav>
+                                        <p:tav tm="100000">
+                                          <p:val>
+                                            <p:strVal val="#ppt_x"/>
+                                          </p:val>
+                                        </p:tav>
+                                      </p:tavLst>
+                                    </p:anim>
+                                    <p:anim calcmode="lin" valueType="num">
+                                      <p:cBhvr additive="base">
+                                        <p:cTn id="23" dur="500" fill="hold"/>
+                                        <p:tgtEl>
+                                          <p:spTgt spid="9"/>
+                                        </p:tgtEl>
+                                        <p:attrNameLst>
+                                          <p:attrName>ppt_y</p:attrName>
+                                        </p:attrNameLst>
+                                      </p:cBhvr>
+                                      <p:tavLst>
+                                        <p:tav tm="0">
+                                          <p:val>
+                                            <p:strVal val="0-#ppt_h/2"/>
+                                          </p:val>
+                                        </p:tav>
+                                        <p:tav tm="100000">
+                                          <p:val>
+                                            <p:strVal val="#ppt_y"/>
+                                          </p:val>
+                                        </p:tav>
+                                      </p:tavLst>
+                                    </p:anim>
+                                  </p:childTnLst>
+                                </p:cTn>
+                              </p:par>
+                              <p:par>
+                                <p:cTn id="24" presetID="10" presetClass="exit" presetSubtype="0" fill="hold" nodeType="withEffect">
+                                  <p:stCondLst>
+                                    <p:cond delay="0"/>
+                                  </p:stCondLst>
+                                  <p:childTnLst>
+                                    <p:animEffect transition="out" filter="fade">
+                                      <p:cBhvr>
+                                        <p:cTn id="25" dur="500"/>
+                                        <p:tgtEl>
+                                          <p:spTgt spid="7"/>
+                                        </p:tgtEl>
+                                      </p:cBhvr>
+                                    </p:animEffect>
+                                    <p:set>
+                                      <p:cBhvr>
+                                        <p:cTn id="26" dur="1" fill="hold">
+                                          <p:stCondLst>
+                                            <p:cond delay="499"/>
+                                          </p:stCondLst>
+                                        </p:cTn>
+                                        <p:tgtEl>
+                                          <p:spTgt spid="7"/>
+                                        </p:tgtEl>
+                                        <p:attrNameLst>
+                                          <p:attrName>style.visibility</p:attrName>
+                                        </p:attrNameLst>
+                                      </p:cBhvr>
+                                      <p:to>
+                                        <p:strVal val="hidden"/>
+                                      </p:to>
+                                    </p:set>
+                                  </p:childTnLst>
+                                </p:cTn>
+                              </p:par>
+                            </p:childTnLst>
+                          </p:cTn>
+                        </p:par>
+                      </p:childTnLst>
+                    </p:cTn>
+                  </p:par>
+                  <p:par>
+                    <p:cTn id="27" fill="hold">
+                      <p:stCondLst>
+                        <p:cond delay="indefinite"/>
+                      </p:stCondLst>
+                      <p:childTnLst>
+                        <p:par>
+                          <p:cTn id="28" fill="hold">
+                            <p:stCondLst>
+                              <p:cond delay="0"/>
+                            </p:stCondLst>
+                            <p:childTnLst>
+                              <p:par>
+                                <p:cTn id="29" presetID="2" presetClass="entr" presetSubtype="1" fill="hold" nodeType="clickEffect">
+                                  <p:stCondLst>
+                                    <p:cond delay="0"/>
+                                  </p:stCondLst>
+                                  <p:childTnLst>
+                                    <p:set>
+                                      <p:cBhvr>
+                                        <p:cTn id="30" dur="1" fill="hold">
+                                          <p:stCondLst>
+                                            <p:cond delay="0"/>
+                                          </p:stCondLst>
+                                        </p:cTn>
+                                        <p:tgtEl>
+                                          <p:spTgt spid="11"/>
+                                        </p:tgtEl>
+                                        <p:attrNameLst>
+                                          <p:attrName>style.visibility</p:attrName>
+                                        </p:attrNameLst>
+                                      </p:cBhvr>
+                                      <p:to>
+                                        <p:strVal val="visible"/>
+                                      </p:to>
+                                    </p:set>
+                                    <p:anim calcmode="lin" valueType="num">
+                                      <p:cBhvr additive="base">
+                                        <p:cTn id="31" dur="500" fill="hold"/>
+                                        <p:tgtEl>
+                                          <p:spTgt spid="11"/>
+                                        </p:tgtEl>
+                                        <p:attrNameLst>
+                                          <p:attrName>ppt_x</p:attrName>
+                                        </p:attrNameLst>
+                                      </p:cBhvr>
+                                      <p:tavLst>
+                                        <p:tav tm="0">
+                                          <p:val>
+                                            <p:strVal val="#ppt_x"/>
+                                          </p:val>
+                                        </p:tav>
+                                        <p:tav tm="100000">
+                                          <p:val>
+                                            <p:strVal val="#ppt_x"/>
+                                          </p:val>
+                                        </p:tav>
+                                      </p:tavLst>
+                                    </p:anim>
+                                    <p:anim calcmode="lin" valueType="num">
+                                      <p:cBhvr additive="base">
+                                        <p:cTn id="32" dur="500" fill="hold"/>
+                                        <p:tgtEl>
+                                          <p:spTgt spid="11"/>
+                                        </p:tgtEl>
+                                        <p:attrNameLst>
+                                          <p:attrName>ppt_y</p:attrName>
+                                        </p:attrNameLst>
+                                      </p:cBhvr>
+                                      <p:tavLst>
+                                        <p:tav tm="0">
+                                          <p:val>
+                                            <p:strVal val="0-#ppt_h/2"/>
+                                          </p:val>
+                                        </p:tav>
+                                        <p:tav tm="100000">
+                                          <p:val>
+                                            <p:strVal val="#ppt_y"/>
+                                          </p:val>
+                                        </p:tav>
+                                      </p:tavLst>
+                                    </p:anim>
+                                  </p:childTnLst>
+                                </p:cTn>
+                              </p:par>
+                            </p:childTnLst>
+                          </p:cTn>
+                        </p:par>
+                      </p:childTnLst>
+                    </p:cTn>
+                  </p:par>
+                  <p:par>
+                    <p:cTn id="33" fill="hold">
+                      <p:stCondLst>
+                        <p:cond delay="indefinite"/>
+                      </p:stCondLst>
+                      <p:childTnLst>
+                        <p:par>
+                          <p:cTn id="34" fill="hold">
+                            <p:stCondLst>
+                              <p:cond delay="0"/>
+                            </p:stCondLst>
+                            <p:childTnLst>
+                              <p:par>
+                                <p:cTn id="35" presetID="2" presetClass="entr" presetSubtype="1" fill="hold" nodeType="clickEffect">
+                                  <p:stCondLst>
+                                    <p:cond delay="0"/>
+                                  </p:stCondLst>
+                                  <p:childTnLst>
+                                    <p:set>
+                                      <p:cBhvr>
+                                        <p:cTn id="36" dur="1" fill="hold">
+                                          <p:stCondLst>
+                                            <p:cond delay="0"/>
+                                          </p:stCondLst>
+                                        </p:cTn>
+                                        <p:tgtEl>
+                                          <p:spTgt spid="10"/>
+                                        </p:tgtEl>
+                                        <p:attrNameLst>
+                                          <p:attrName>style.visibility</p:attrName>
+                                        </p:attrNameLst>
+                                      </p:cBhvr>
+                                      <p:to>
+                                        <p:strVal val="visible"/>
+                                      </p:to>
+                                    </p:set>
+                                    <p:anim calcmode="lin" valueType="num">
+                                      <p:cBhvr additive="base">
+                                        <p:cTn id="37" dur="500" fill="hold"/>
+                                        <p:tgtEl>
+                                          <p:spTgt spid="10"/>
+                                        </p:tgtEl>
+                                        <p:attrNameLst>
+                                          <p:attrName>ppt_x</p:attrName>
+                                        </p:attrNameLst>
+                                      </p:cBhvr>
+                                      <p:tavLst>
+                                        <p:tav tm="0">
+                                          <p:val>
+                                            <p:strVal val="#ppt_x"/>
+                                          </p:val>
+                                        </p:tav>
+                                        <p:tav tm="100000">
+                                          <p:val>
+                                            <p:strVal val="#ppt_x"/>
+                                          </p:val>
+                                        </p:tav>
+                                      </p:tavLst>
+                                    </p:anim>
+                                    <p:anim calcmode="lin" valueType="num">
+                                      <p:cBhvr additive="base">
+                                        <p:cTn id="38" dur="500" fill="hold"/>
+                                        <p:tgtEl>
+                                          <p:spTgt spid="10"/>
+                                        </p:tgtEl>
+                                        <p:attrNameLst>
+                                          <p:attrName>ppt_y</p:attrName>
+                                        </p:attrNameLst>
+                                      </p:cBhvr>
+                                      <p:tavLst>
+                                        <p:tav tm="0">
+                                          <p:val>
+                                            <p:strVal val="0-#ppt_h/2"/>
+                                          </p:val>
+                                        </p:tav>
+                                        <p:tav tm="100000">
+                                          <p:val>
+                                            <p:strVal val="#ppt_y"/>
+                                          </p:val>
+                                        </p:tav>
+                                      </p:tavLst>
+                                    </p:anim>
+                                  </p:childTnLst>
+                                </p:cTn>
+                              </p:par>
+                              <p:par>
+                                <p:cTn id="39" presetID="10" presetClass="exit" presetSubtype="0" fill="hold" nodeType="withEffect">
+                                  <p:stCondLst>
+                                    <p:cond delay="0"/>
+                                  </p:stCondLst>
+                                  <p:childTnLst>
+                                    <p:animEffect transition="out" filter="fade">
+                                      <p:cBhvr>
+                                        <p:cTn id="40" dur="500"/>
+                                        <p:tgtEl>
+                                          <p:spTgt spid="11"/>
+                                        </p:tgtEl>
+                                      </p:cBhvr>
+                                    </p:animEffect>
+                                    <p:set>
+                                      <p:cBhvr>
+                                        <p:cTn id="41" dur="1" fill="hold">
+                                          <p:stCondLst>
+                                            <p:cond delay="499"/>
+                                          </p:stCondLst>
+                                        </p:cTn>
+                                        <p:tgtEl>
+                                          <p:spTgt spid="11"/>
+                                        </p:tgtEl>
+                                        <p:attrNameLst>
+                                          <p:attrName>style.visibility</p:attrName>
+                                        </p:attrNameLst>
+                                      </p:cBhvr>
+                                      <p:to>
+                                        <p:strVal val="hidden"/>
+                                      </p:to>
+                                    </p:set>
+                                  </p:childTnLst>
+                                </p:cTn>
+                              </p:par>
+                              <p:par>
+                                <p:cTn id="42" presetID="10" presetClass="exit" presetSubtype="0" fill="hold" nodeType="withEffect">
+                                  <p:stCondLst>
+                                    <p:cond delay="0"/>
+                                  </p:stCondLst>
+                                  <p:childTnLst>
+                                    <p:animEffect transition="out" filter="fade">
+                                      <p:cBhvr>
+                                        <p:cTn id="43" dur="500"/>
+                                        <p:tgtEl>
+                                          <p:spTgt spid="9"/>
+                                        </p:tgtEl>
+                                      </p:cBhvr>
+                                    </p:animEffect>
+                                    <p:set>
+                                      <p:cBhvr>
+                                        <p:cTn id="44" dur="1" fill="hold">
+                                          <p:stCondLst>
+                                            <p:cond delay="499"/>
+                                          </p:stCondLst>
+                                        </p:cTn>
+                                        <p:tgtEl>
+                                          <p:spTgt spid="9"/>
+                                        </p:tgtEl>
+                                        <p:attrNameLst>
+                                          <p:attrName>style.visibility</p:attrName>
+                                        </p:attrNameLst>
+                                      </p:cBhvr>
+                                      <p:to>
+                                        <p:strVal val="hidden"/>
+                                      </p:to>
+                                    </p:set>
+                                  </p:childTnLst>
+                                </p:cTn>
+                              </p:par>
+                            </p:childTnLst>
+                          </p:cTn>
+                        </p:par>
+                      </p:childTnLst>
+                    </p:cTn>
+                  </p:par>
+                </p:childTnLst>
+              </p:cTn>
+              <p:prevCondLst>
+                <p:cond evt="onPrev" delay="0">
+                  <p:tgtEl>
+                    <p:sldTgt/>
+                  </p:tgtEl>
+                </p:cond>
+              </p:prevCondLst>
+              <p:nextCondLst>
+                <p:cond evt="onNext" delay="0">
+                  <p:tgtEl>
+                    <p:sldTgt/>
+                  </p:tgtEl>
+                </p:cond>
+              </p:nextCondLst>
+            </p:seq>
+          </p:childTnLst>
+        </p:cTn>
+      </p:par>
+    </p:tnLst>
+  </p:timing>
 </p:sld>
 </file>
 
@@ -8532,6 +10094,18 @@
   <p:clrMapOvr>
     <a:masterClrMapping/>
   </p:clrMapOvr>
+  <mc:AlternateContent xmlns:mc="http://schemas.openxmlformats.org/markup-compatibility/2006">
+    <mc:Choice xmlns:p14="http://schemas.microsoft.com/office/powerpoint/2010/main" Requires="p14">
+      <p:transition spd="med" p14:dur="700">
+        <p:fade/>
+      </p:transition>
+    </mc:Choice>
+    <mc:Fallback>
+      <p:transition spd="med">
+        <p:fade/>
+      </p:transition>
+    </mc:Fallback>
+  </mc:AlternateContent>
 </p:sld>
 </file>
 

</xml_diff>

<commit_message>
Minor changes to lightning talk slide notes
</commit_message>
<xml_diff>
--- a/Lightning Talk.pptx
+++ b/Lightning Talk.pptx
@@ -801,6 +801,17 @@
               <a:rPr lang="en-US" dirty="0"/>
               <a:t>    Internal error that doesn't happen without using the tool.</a:t>
             </a:r>
+          </a:p>
+          <a:p>
+            <a:r>
+              <a:rPr lang="en-US" dirty="0"/>
+              <a:t>    Spent lots of </a:t>
+            </a:r>
+            <a:r>
+              <a:rPr lang="en-US"/>
+              <a:t>time troubleshooting this.</a:t>
+            </a:r>
+            <a:endParaRPr lang="en-US" dirty="0"/>
           </a:p>
           <a:p>
             <a:r>
@@ -4789,13 +4800,13 @@
   <p:clrMapOvr>
     <a:masterClrMapping/>
   </p:clrMapOvr>
-  <mc:AlternateContent xmlns:mc="http://schemas.openxmlformats.org/markup-compatibility/2006">
-    <mc:Choice xmlns:p14="http://schemas.microsoft.com/office/powerpoint/2010/main" Requires="p14">
+  <mc:AlternateContent xmlns:mc="http://schemas.openxmlformats.org/markup-compatibility/2006" xmlns:p14="http://schemas.microsoft.com/office/powerpoint/2010/main">
+    <mc:Choice Requires="p14">
       <p:transition spd="med" p14:dur="700">
         <p:fade/>
       </p:transition>
     </mc:Choice>
-    <mc:Fallback>
+    <mc:Fallback xmlns="">
       <p:transition spd="med">
         <p:fade/>
       </p:transition>
@@ -4950,13 +4961,13 @@
   <p:clrMapOvr>
     <a:masterClrMapping/>
   </p:clrMapOvr>
-  <mc:AlternateContent xmlns:mc="http://schemas.openxmlformats.org/markup-compatibility/2006">
-    <mc:Choice xmlns:p14="http://schemas.microsoft.com/office/powerpoint/2010/main" Requires="p14">
+  <mc:AlternateContent xmlns:mc="http://schemas.openxmlformats.org/markup-compatibility/2006" xmlns:p14="http://schemas.microsoft.com/office/powerpoint/2010/main">
+    <mc:Choice Requires="p14">
       <p:transition spd="med" p14:dur="700">
         <p:fade/>
       </p:transition>
     </mc:Choice>
-    <mc:Fallback>
+    <mc:Fallback xmlns="">
       <p:transition spd="med">
         <p:fade/>
       </p:transition>
@@ -5147,13 +5158,13 @@
   <p:clrMapOvr>
     <a:masterClrMapping/>
   </p:clrMapOvr>
-  <mc:AlternateContent xmlns:mc="http://schemas.openxmlformats.org/markup-compatibility/2006">
-    <mc:Choice xmlns:p14="http://schemas.microsoft.com/office/powerpoint/2010/main" Requires="p14">
+  <mc:AlternateContent xmlns:mc="http://schemas.openxmlformats.org/markup-compatibility/2006" xmlns:p14="http://schemas.microsoft.com/office/powerpoint/2010/main">
+    <mc:Choice Requires="p14">
       <p:transition spd="med" p14:dur="700">
         <p:fade/>
       </p:transition>
     </mc:Choice>
-    <mc:Fallback>
+    <mc:Fallback xmlns="">
       <p:transition spd="med">
         <p:fade/>
       </p:transition>
@@ -6809,13 +6820,13 @@
   <p:clrMapOvr>
     <a:masterClrMapping/>
   </p:clrMapOvr>
-  <mc:AlternateContent xmlns:mc="http://schemas.openxmlformats.org/markup-compatibility/2006">
-    <mc:Choice xmlns:p14="http://schemas.microsoft.com/office/powerpoint/2010/main" Requires="p14">
+  <mc:AlternateContent xmlns:mc="http://schemas.openxmlformats.org/markup-compatibility/2006" xmlns:p14="http://schemas.microsoft.com/office/powerpoint/2010/main">
+    <mc:Choice Requires="p14">
       <p:transition spd="med" p14:dur="700">
         <p:fade/>
       </p:transition>
     </mc:Choice>
-    <mc:Fallback>
+    <mc:Fallback xmlns="">
       <p:transition spd="med">
         <p:fade/>
       </p:transition>
@@ -9344,13 +9355,13 @@
   <p:clrMapOvr>
     <a:masterClrMapping/>
   </p:clrMapOvr>
-  <mc:AlternateContent xmlns:mc="http://schemas.openxmlformats.org/markup-compatibility/2006">
-    <mc:Choice xmlns:p14="http://schemas.microsoft.com/office/powerpoint/2010/main" Requires="p14">
+  <mc:AlternateContent xmlns:mc="http://schemas.openxmlformats.org/markup-compatibility/2006" xmlns:p14="http://schemas.microsoft.com/office/powerpoint/2010/main">
+    <mc:Choice Requires="p14">
       <p:transition spd="med" p14:dur="700">
         <p:fade/>
       </p:transition>
     </mc:Choice>
-    <mc:Fallback>
+    <mc:Fallback xmlns="">
       <p:transition spd="med">
         <p:fade/>
       </p:transition>
@@ -10094,13 +10105,13 @@
   <p:clrMapOvr>
     <a:masterClrMapping/>
   </p:clrMapOvr>
-  <mc:AlternateContent xmlns:mc="http://schemas.openxmlformats.org/markup-compatibility/2006">
-    <mc:Choice xmlns:p14="http://schemas.microsoft.com/office/powerpoint/2010/main" Requires="p14">
+  <mc:AlternateContent xmlns:mc="http://schemas.openxmlformats.org/markup-compatibility/2006" xmlns:p14="http://schemas.microsoft.com/office/powerpoint/2010/main">
+    <mc:Choice Requires="p14">
       <p:transition spd="med" p14:dur="700">
         <p:fade/>
       </p:transition>
     </mc:Choice>
-    <mc:Fallback>
+    <mc:Fallback xmlns="">
       <p:transition spd="med">
         <p:fade/>
       </p:transition>

</xml_diff>